<commit_message>
update on road weighting
</commit_message>
<xml_diff>
--- a/Figures SESMO.pptx
+++ b/Figures SESMO.pptx
@@ -7,6 +7,7 @@
   <p:sldIdLst>
     <p:sldId id="258" r:id="rId2"/>
     <p:sldId id="257" r:id="rId3"/>
+    <p:sldId id="259" r:id="rId4"/>
   </p:sldIdLst>
   <p:sldSz cx="12192000" cy="6858000"/>
   <p:notesSz cx="6858000" cy="9144000"/>
@@ -262,7 +263,7 @@
           <a:p>
             <a:fld id="{645C6696-A407-7348-BEFE-FA4AC4DA3CCA}" type="datetimeFigureOut">
               <a:rPr lang="en-GB" smtClean="0"/>
-              <a:t>12/12/2023</a:t>
+              <a:t>14/12/2023</a:t>
             </a:fld>
             <a:endParaRPr lang="en-GB"/>
           </a:p>
@@ -462,7 +463,7 @@
           <a:p>
             <a:fld id="{645C6696-A407-7348-BEFE-FA4AC4DA3CCA}" type="datetimeFigureOut">
               <a:rPr lang="en-GB" smtClean="0"/>
-              <a:t>12/12/2023</a:t>
+              <a:t>14/12/2023</a:t>
             </a:fld>
             <a:endParaRPr lang="en-GB"/>
           </a:p>
@@ -672,7 +673,7 @@
           <a:p>
             <a:fld id="{645C6696-A407-7348-BEFE-FA4AC4DA3CCA}" type="datetimeFigureOut">
               <a:rPr lang="en-GB" smtClean="0"/>
-              <a:t>12/12/2023</a:t>
+              <a:t>14/12/2023</a:t>
             </a:fld>
             <a:endParaRPr lang="en-GB"/>
           </a:p>
@@ -872,7 +873,7 @@
           <a:p>
             <a:fld id="{645C6696-A407-7348-BEFE-FA4AC4DA3CCA}" type="datetimeFigureOut">
               <a:rPr lang="en-GB" smtClean="0"/>
-              <a:t>12/12/2023</a:t>
+              <a:t>14/12/2023</a:t>
             </a:fld>
             <a:endParaRPr lang="en-GB"/>
           </a:p>
@@ -1148,7 +1149,7 @@
           <a:p>
             <a:fld id="{645C6696-A407-7348-BEFE-FA4AC4DA3CCA}" type="datetimeFigureOut">
               <a:rPr lang="en-GB" smtClean="0"/>
-              <a:t>12/12/2023</a:t>
+              <a:t>14/12/2023</a:t>
             </a:fld>
             <a:endParaRPr lang="en-GB"/>
           </a:p>
@@ -1416,7 +1417,7 @@
           <a:p>
             <a:fld id="{645C6696-A407-7348-BEFE-FA4AC4DA3CCA}" type="datetimeFigureOut">
               <a:rPr lang="en-GB" smtClean="0"/>
-              <a:t>12/12/2023</a:t>
+              <a:t>14/12/2023</a:t>
             </a:fld>
             <a:endParaRPr lang="en-GB"/>
           </a:p>
@@ -1831,7 +1832,7 @@
           <a:p>
             <a:fld id="{645C6696-A407-7348-BEFE-FA4AC4DA3CCA}" type="datetimeFigureOut">
               <a:rPr lang="en-GB" smtClean="0"/>
-              <a:t>12/12/2023</a:t>
+              <a:t>14/12/2023</a:t>
             </a:fld>
             <a:endParaRPr lang="en-GB"/>
           </a:p>
@@ -1973,7 +1974,7 @@
           <a:p>
             <a:fld id="{645C6696-A407-7348-BEFE-FA4AC4DA3CCA}" type="datetimeFigureOut">
               <a:rPr lang="en-GB" smtClean="0"/>
-              <a:t>12/12/2023</a:t>
+              <a:t>14/12/2023</a:t>
             </a:fld>
             <a:endParaRPr lang="en-GB"/>
           </a:p>
@@ -2086,7 +2087,7 @@
           <a:p>
             <a:fld id="{645C6696-A407-7348-BEFE-FA4AC4DA3CCA}" type="datetimeFigureOut">
               <a:rPr lang="en-GB" smtClean="0"/>
-              <a:t>12/12/2023</a:t>
+              <a:t>14/12/2023</a:t>
             </a:fld>
             <a:endParaRPr lang="en-GB"/>
           </a:p>
@@ -2399,7 +2400,7 @@
           <a:p>
             <a:fld id="{645C6696-A407-7348-BEFE-FA4AC4DA3CCA}" type="datetimeFigureOut">
               <a:rPr lang="en-GB" smtClean="0"/>
-              <a:t>12/12/2023</a:t>
+              <a:t>14/12/2023</a:t>
             </a:fld>
             <a:endParaRPr lang="en-GB"/>
           </a:p>
@@ -2688,7 +2689,7 @@
           <a:p>
             <a:fld id="{645C6696-A407-7348-BEFE-FA4AC4DA3CCA}" type="datetimeFigureOut">
               <a:rPr lang="en-GB" smtClean="0"/>
-              <a:t>12/12/2023</a:t>
+              <a:t>14/12/2023</a:t>
             </a:fld>
             <a:endParaRPr lang="en-GB"/>
           </a:p>
@@ -2931,7 +2932,7 @@
           <a:p>
             <a:fld id="{645C6696-A407-7348-BEFE-FA4AC4DA3CCA}" type="datetimeFigureOut">
               <a:rPr lang="en-GB" smtClean="0"/>
-              <a:t>12/12/2023</a:t>
+              <a:t>14/12/2023</a:t>
             </a:fld>
             <a:endParaRPr lang="en-GB"/>
           </a:p>
@@ -3662,6 +3663,634 @@
 </p:sld>
 </file>
 
+<file path=ppt/slides/slide3.xml><?xml version="1.0" encoding="utf-8"?>
+<p:sld xmlns:a="http://schemas.openxmlformats.org/drawingml/2006/main" xmlns:r="http://schemas.openxmlformats.org/officeDocument/2006/relationships" xmlns:p="http://schemas.openxmlformats.org/presentationml/2006/main">
+  <p:cSld>
+    <p:spTree>
+      <p:nvGrpSpPr>
+        <p:cNvPr id="1" name=""/>
+        <p:cNvGrpSpPr/>
+        <p:nvPr/>
+      </p:nvGrpSpPr>
+      <p:grpSpPr>
+        <a:xfrm>
+          <a:off x="0" y="0"/>
+          <a:ext cx="0" cy="0"/>
+          <a:chOff x="0" y="0"/>
+          <a:chExt cx="0" cy="0"/>
+        </a:xfrm>
+      </p:grpSpPr>
+      <p:sp>
+        <p:nvSpPr>
+          <p:cNvPr id="2" name="사각형: 둥근 모서리 1">
+            <a:extLst>
+              <a:ext uri="{FF2B5EF4-FFF2-40B4-BE49-F238E27FC236}">
+                <a16:creationId xmlns:a16="http://schemas.microsoft.com/office/drawing/2014/main" id="{72A0B2D2-E384-6399-7FDF-1043FE3161D0}"/>
+              </a:ext>
+            </a:extLst>
+          </p:cNvPr>
+          <p:cNvSpPr/>
+          <p:nvPr/>
+        </p:nvSpPr>
+        <p:spPr>
+          <a:xfrm>
+            <a:off x="419492" y="2215297"/>
+            <a:ext cx="1979629" cy="1979629"/>
+          </a:xfrm>
+          <a:prstGeom prst="roundRect">
+            <a:avLst/>
+          </a:prstGeom>
+          <a:solidFill>
+            <a:schemeClr val="accent1">
+              <a:lumMod val="40000"/>
+              <a:lumOff val="60000"/>
+            </a:schemeClr>
+          </a:solidFill>
+          <a:ln>
+            <a:noFill/>
+          </a:ln>
+        </p:spPr>
+        <p:style>
+          <a:lnRef idx="2">
+            <a:schemeClr val="accent1">
+              <a:shade val="15000"/>
+            </a:schemeClr>
+          </a:lnRef>
+          <a:fillRef idx="1">
+            <a:schemeClr val="accent1"/>
+          </a:fillRef>
+          <a:effectRef idx="0">
+            <a:schemeClr val="accent1"/>
+          </a:effectRef>
+          <a:fontRef idx="minor">
+            <a:schemeClr val="lt1"/>
+          </a:fontRef>
+        </p:style>
+        <p:txBody>
+          <a:bodyPr rtlCol="0" anchor="t" anchorCtr="0"/>
+          <a:lstStyle/>
+          <a:p>
+            <a:r>
+              <a:rPr lang="en-GB" sz="2000" b="1" dirty="0">
+                <a:solidFill>
+                  <a:schemeClr val="bg2">
+                    <a:lumMod val="25000"/>
+                  </a:schemeClr>
+                </a:solidFill>
+                <a:latin typeface="Arial" panose="020B0604020202020204" pitchFamily="34" charset="0"/>
+                <a:cs typeface="Arial" panose="020B0604020202020204" pitchFamily="34" charset="0"/>
+              </a:rPr>
+              <a:t>Step 1:</a:t>
+            </a:r>
+          </a:p>
+          <a:p>
+            <a:r>
+              <a:rPr lang="en-GB" dirty="0">
+                <a:solidFill>
+                  <a:schemeClr val="bg2">
+                    <a:lumMod val="25000"/>
+                  </a:schemeClr>
+                </a:solidFill>
+                <a:latin typeface="Arial" panose="020B0604020202020204" pitchFamily="34" charset="0"/>
+                <a:cs typeface="Arial" panose="020B0604020202020204" pitchFamily="34" charset="0"/>
+              </a:rPr>
+              <a:t>Identify Missing Data</a:t>
+            </a:r>
+          </a:p>
+        </p:txBody>
+      </p:sp>
+      <p:sp>
+        <p:nvSpPr>
+          <p:cNvPr id="3" name="사각형: 둥근 모서리 2">
+            <a:extLst>
+              <a:ext uri="{FF2B5EF4-FFF2-40B4-BE49-F238E27FC236}">
+                <a16:creationId xmlns:a16="http://schemas.microsoft.com/office/drawing/2014/main" id="{733B1BE3-52BB-F7AE-5104-1246E9640D90}"/>
+              </a:ext>
+            </a:extLst>
+          </p:cNvPr>
+          <p:cNvSpPr/>
+          <p:nvPr/>
+        </p:nvSpPr>
+        <p:spPr>
+          <a:xfrm>
+            <a:off x="2668963" y="2215299"/>
+            <a:ext cx="1979629" cy="1979629"/>
+          </a:xfrm>
+          <a:prstGeom prst="roundRect">
+            <a:avLst/>
+          </a:prstGeom>
+          <a:solidFill>
+            <a:schemeClr val="accent1">
+              <a:lumMod val="60000"/>
+              <a:lumOff val="40000"/>
+            </a:schemeClr>
+          </a:solidFill>
+          <a:ln>
+            <a:noFill/>
+          </a:ln>
+        </p:spPr>
+        <p:style>
+          <a:lnRef idx="2">
+            <a:schemeClr val="accent1">
+              <a:shade val="15000"/>
+            </a:schemeClr>
+          </a:lnRef>
+          <a:fillRef idx="1">
+            <a:schemeClr val="accent1"/>
+          </a:fillRef>
+          <a:effectRef idx="0">
+            <a:schemeClr val="accent1"/>
+          </a:effectRef>
+          <a:fontRef idx="minor">
+            <a:schemeClr val="lt1"/>
+          </a:fontRef>
+        </p:style>
+        <p:txBody>
+          <a:bodyPr rtlCol="0" anchor="t" anchorCtr="0"/>
+          <a:lstStyle/>
+          <a:p>
+            <a:r>
+              <a:rPr lang="en-GB" sz="2000" b="1" dirty="0">
+                <a:solidFill>
+                  <a:schemeClr val="bg2">
+                    <a:lumMod val="25000"/>
+                  </a:schemeClr>
+                </a:solidFill>
+                <a:latin typeface="Arial" panose="020B0604020202020204" pitchFamily="34" charset="0"/>
+                <a:cs typeface="Arial" panose="020B0604020202020204" pitchFamily="34" charset="0"/>
+              </a:rPr>
+              <a:t>Step 2:</a:t>
+            </a:r>
+          </a:p>
+          <a:p>
+            <a:r>
+              <a:rPr lang="en-GB" dirty="0">
+                <a:solidFill>
+                  <a:schemeClr val="bg2">
+                    <a:lumMod val="25000"/>
+                  </a:schemeClr>
+                </a:solidFill>
+                <a:latin typeface="Arial" panose="020B0604020202020204" pitchFamily="34" charset="0"/>
+                <a:cs typeface="Arial" panose="020B0604020202020204" pitchFamily="34" charset="0"/>
+              </a:rPr>
+              <a:t>Impute Missing Data using Seasonal Moving Average (SMA)</a:t>
+            </a:r>
+          </a:p>
+        </p:txBody>
+      </p:sp>
+      <p:sp>
+        <p:nvSpPr>
+          <p:cNvPr id="4" name="사각형: 둥근 모서리 3">
+            <a:extLst>
+              <a:ext uri="{FF2B5EF4-FFF2-40B4-BE49-F238E27FC236}">
+                <a16:creationId xmlns:a16="http://schemas.microsoft.com/office/drawing/2014/main" id="{0B2800C7-84FA-76B1-FAA7-02859779F083}"/>
+              </a:ext>
+            </a:extLst>
+          </p:cNvPr>
+          <p:cNvSpPr/>
+          <p:nvPr/>
+        </p:nvSpPr>
+        <p:spPr>
+          <a:xfrm>
+            <a:off x="4918434" y="2215299"/>
+            <a:ext cx="1979629" cy="1979629"/>
+          </a:xfrm>
+          <a:prstGeom prst="roundRect">
+            <a:avLst/>
+          </a:prstGeom>
+          <a:ln>
+            <a:noFill/>
+          </a:ln>
+        </p:spPr>
+        <p:style>
+          <a:lnRef idx="2">
+            <a:schemeClr val="accent1">
+              <a:shade val="15000"/>
+            </a:schemeClr>
+          </a:lnRef>
+          <a:fillRef idx="1">
+            <a:schemeClr val="accent1"/>
+          </a:fillRef>
+          <a:effectRef idx="0">
+            <a:schemeClr val="accent1"/>
+          </a:effectRef>
+          <a:fontRef idx="minor">
+            <a:schemeClr val="lt1"/>
+          </a:fontRef>
+        </p:style>
+        <p:txBody>
+          <a:bodyPr rtlCol="0" anchor="t" anchorCtr="0"/>
+          <a:lstStyle/>
+          <a:p>
+            <a:r>
+              <a:rPr lang="en-GB" sz="2000" b="1" dirty="0">
+                <a:solidFill>
+                  <a:schemeClr val="bg1">
+                    <a:lumMod val="95000"/>
+                  </a:schemeClr>
+                </a:solidFill>
+                <a:latin typeface="Arial" panose="020B0604020202020204" pitchFamily="34" charset="0"/>
+                <a:cs typeface="Arial" panose="020B0604020202020204" pitchFamily="34" charset="0"/>
+              </a:rPr>
+              <a:t>Step 3: </a:t>
+            </a:r>
+          </a:p>
+          <a:p>
+            <a:r>
+              <a:rPr lang="en-GB" dirty="0">
+                <a:latin typeface="Arial" panose="020B0604020202020204" pitchFamily="34" charset="0"/>
+                <a:cs typeface="Arial" panose="020B0604020202020204" pitchFamily="34" charset="0"/>
+              </a:rPr>
+              <a:t>Generate NO</a:t>
+            </a:r>
+            <a:r>
+              <a:rPr lang="en-GB" baseline="-25000" dirty="0">
+                <a:latin typeface="Arial" panose="020B0604020202020204" pitchFamily="34" charset="0"/>
+                <a:cs typeface="Arial" panose="020B0604020202020204" pitchFamily="34" charset="0"/>
+              </a:rPr>
+              <a:t>2</a:t>
+            </a:r>
+            <a:r>
+              <a:rPr lang="en-GB" dirty="0">
+                <a:latin typeface="Arial" panose="020B0604020202020204" pitchFamily="34" charset="0"/>
+                <a:cs typeface="Arial" panose="020B0604020202020204" pitchFamily="34" charset="0"/>
+              </a:rPr>
+              <a:t> data from the nearest background station</a:t>
+            </a:r>
+          </a:p>
+        </p:txBody>
+      </p:sp>
+      <p:sp>
+        <p:nvSpPr>
+          <p:cNvPr id="5" name="사각형: 둥근 모서리 4">
+            <a:extLst>
+              <a:ext uri="{FF2B5EF4-FFF2-40B4-BE49-F238E27FC236}">
+                <a16:creationId xmlns:a16="http://schemas.microsoft.com/office/drawing/2014/main" id="{25DCE5C4-0494-4CC4-6344-926747B6A8AB}"/>
+              </a:ext>
+            </a:extLst>
+          </p:cNvPr>
+          <p:cNvSpPr/>
+          <p:nvPr/>
+        </p:nvSpPr>
+        <p:spPr>
+          <a:xfrm>
+            <a:off x="7167905" y="2215298"/>
+            <a:ext cx="1979629" cy="1979629"/>
+          </a:xfrm>
+          <a:prstGeom prst="roundRect">
+            <a:avLst/>
+          </a:prstGeom>
+          <a:solidFill>
+            <a:schemeClr val="accent1">
+              <a:lumMod val="75000"/>
+            </a:schemeClr>
+          </a:solidFill>
+          <a:ln>
+            <a:noFill/>
+          </a:ln>
+        </p:spPr>
+        <p:style>
+          <a:lnRef idx="2">
+            <a:schemeClr val="accent1">
+              <a:shade val="15000"/>
+            </a:schemeClr>
+          </a:lnRef>
+          <a:fillRef idx="1">
+            <a:schemeClr val="accent1"/>
+          </a:fillRef>
+          <a:effectRef idx="0">
+            <a:schemeClr val="accent1"/>
+          </a:effectRef>
+          <a:fontRef idx="minor">
+            <a:schemeClr val="lt1"/>
+          </a:fontRef>
+        </p:style>
+        <p:txBody>
+          <a:bodyPr rtlCol="0" anchor="t" anchorCtr="0"/>
+          <a:lstStyle/>
+          <a:p>
+            <a:r>
+              <a:rPr lang="en-GB" sz="2000" b="1" dirty="0">
+                <a:latin typeface="Arial" panose="020B0604020202020204" pitchFamily="34" charset="0"/>
+                <a:cs typeface="Arial" panose="020B0604020202020204" pitchFamily="34" charset="0"/>
+              </a:rPr>
+              <a:t>Step 4:</a:t>
+            </a:r>
+          </a:p>
+          <a:p>
+            <a:r>
+              <a:rPr lang="en-GB" dirty="0">
+                <a:latin typeface="Arial" panose="020B0604020202020204" pitchFamily="34" charset="0"/>
+                <a:cs typeface="Arial" panose="020B0604020202020204" pitchFamily="34" charset="0"/>
+              </a:rPr>
+              <a:t>Add Road Weighting on Road Grids</a:t>
+            </a:r>
+          </a:p>
+        </p:txBody>
+      </p:sp>
+      <p:sp>
+        <p:nvSpPr>
+          <p:cNvPr id="6" name="사각형: 둥근 모서리 5">
+            <a:extLst>
+              <a:ext uri="{FF2B5EF4-FFF2-40B4-BE49-F238E27FC236}">
+                <a16:creationId xmlns:a16="http://schemas.microsoft.com/office/drawing/2014/main" id="{00C0217F-2ECB-5F2D-1D0A-0A209B422094}"/>
+              </a:ext>
+            </a:extLst>
+          </p:cNvPr>
+          <p:cNvSpPr/>
+          <p:nvPr/>
+        </p:nvSpPr>
+        <p:spPr>
+          <a:xfrm>
+            <a:off x="9417375" y="2215298"/>
+            <a:ext cx="1979629" cy="1979629"/>
+          </a:xfrm>
+          <a:prstGeom prst="roundRect">
+            <a:avLst/>
+          </a:prstGeom>
+          <a:solidFill>
+            <a:schemeClr val="accent1">
+              <a:lumMod val="50000"/>
+            </a:schemeClr>
+          </a:solidFill>
+          <a:ln>
+            <a:noFill/>
+          </a:ln>
+        </p:spPr>
+        <p:style>
+          <a:lnRef idx="2">
+            <a:schemeClr val="accent1">
+              <a:shade val="15000"/>
+            </a:schemeClr>
+          </a:lnRef>
+          <a:fillRef idx="1">
+            <a:schemeClr val="accent1"/>
+          </a:fillRef>
+          <a:effectRef idx="0">
+            <a:schemeClr val="accent1"/>
+          </a:effectRef>
+          <a:fontRef idx="minor">
+            <a:schemeClr val="lt1"/>
+          </a:fontRef>
+        </p:style>
+        <p:txBody>
+          <a:bodyPr rtlCol="0" anchor="t" anchorCtr="0"/>
+          <a:lstStyle/>
+          <a:p>
+            <a:r>
+              <a:rPr lang="en-GB" sz="2000" b="1" dirty="0">
+                <a:latin typeface="Arial" panose="020B0604020202020204" pitchFamily="34" charset="0"/>
+                <a:cs typeface="Arial" panose="020B0604020202020204" pitchFamily="34" charset="0"/>
+              </a:rPr>
+              <a:t>Step 5:</a:t>
+            </a:r>
+          </a:p>
+          <a:p>
+            <a:r>
+              <a:rPr lang="en-GB" dirty="0">
+                <a:latin typeface="Arial" panose="020B0604020202020204" pitchFamily="34" charset="0"/>
+                <a:cs typeface="Arial" panose="020B0604020202020204" pitchFamily="34" charset="0"/>
+              </a:rPr>
+              <a:t>Validate Modelled Road NO</a:t>
+            </a:r>
+            <a:r>
+              <a:rPr lang="en-GB" baseline="-25000" dirty="0">
+                <a:latin typeface="Arial" panose="020B0604020202020204" pitchFamily="34" charset="0"/>
+                <a:cs typeface="Arial" panose="020B0604020202020204" pitchFamily="34" charset="0"/>
+              </a:rPr>
+              <a:t>2</a:t>
+            </a:r>
+            <a:r>
+              <a:rPr lang="en-GB" dirty="0">
+                <a:latin typeface="Arial" panose="020B0604020202020204" pitchFamily="34" charset="0"/>
+                <a:cs typeface="Arial" panose="020B0604020202020204" pitchFamily="34" charset="0"/>
+              </a:rPr>
+              <a:t> with existing data</a:t>
+            </a:r>
+          </a:p>
+        </p:txBody>
+      </p:sp>
+      <p:sp>
+        <p:nvSpPr>
+          <p:cNvPr id="7" name="이등변 삼각형 6">
+            <a:extLst>
+              <a:ext uri="{FF2B5EF4-FFF2-40B4-BE49-F238E27FC236}">
+                <a16:creationId xmlns:a16="http://schemas.microsoft.com/office/drawing/2014/main" id="{F2EF343F-FC17-37E6-5178-E14287C68B63}"/>
+              </a:ext>
+            </a:extLst>
+          </p:cNvPr>
+          <p:cNvSpPr/>
+          <p:nvPr/>
+        </p:nvSpPr>
+        <p:spPr>
+          <a:xfrm rot="5400000">
+            <a:off x="2369971" y="3016579"/>
+            <a:ext cx="334029" cy="207390"/>
+          </a:xfrm>
+          <a:prstGeom prst="triangle">
+            <a:avLst/>
+          </a:prstGeom>
+          <a:solidFill>
+            <a:schemeClr val="accent4"/>
+          </a:solidFill>
+          <a:ln>
+            <a:noFill/>
+          </a:ln>
+        </p:spPr>
+        <p:style>
+          <a:lnRef idx="2">
+            <a:schemeClr val="accent1">
+              <a:shade val="15000"/>
+            </a:schemeClr>
+          </a:lnRef>
+          <a:fillRef idx="1">
+            <a:schemeClr val="accent1"/>
+          </a:fillRef>
+          <a:effectRef idx="0">
+            <a:schemeClr val="accent1"/>
+          </a:effectRef>
+          <a:fontRef idx="minor">
+            <a:schemeClr val="lt1"/>
+          </a:fontRef>
+        </p:style>
+        <p:txBody>
+          <a:bodyPr rtlCol="0" anchor="ctr"/>
+          <a:lstStyle/>
+          <a:p>
+            <a:pPr algn="ctr"/>
+            <a:endParaRPr lang="en-GB"/>
+          </a:p>
+        </p:txBody>
+      </p:sp>
+      <p:sp>
+        <p:nvSpPr>
+          <p:cNvPr id="8" name="이등변 삼각형 7">
+            <a:extLst>
+              <a:ext uri="{FF2B5EF4-FFF2-40B4-BE49-F238E27FC236}">
+                <a16:creationId xmlns:a16="http://schemas.microsoft.com/office/drawing/2014/main" id="{68129FA5-C58E-BA59-FE0C-6DE578A5DE6D}"/>
+              </a:ext>
+            </a:extLst>
+          </p:cNvPr>
+          <p:cNvSpPr/>
+          <p:nvPr/>
+        </p:nvSpPr>
+        <p:spPr>
+          <a:xfrm rot="5400000">
+            <a:off x="4613554" y="3016580"/>
+            <a:ext cx="334029" cy="207390"/>
+          </a:xfrm>
+          <a:prstGeom prst="triangle">
+            <a:avLst/>
+          </a:prstGeom>
+          <a:solidFill>
+            <a:schemeClr val="accent4"/>
+          </a:solidFill>
+          <a:ln>
+            <a:noFill/>
+          </a:ln>
+        </p:spPr>
+        <p:style>
+          <a:lnRef idx="2">
+            <a:schemeClr val="accent1">
+              <a:shade val="15000"/>
+            </a:schemeClr>
+          </a:lnRef>
+          <a:fillRef idx="1">
+            <a:schemeClr val="accent1"/>
+          </a:fillRef>
+          <a:effectRef idx="0">
+            <a:schemeClr val="accent1"/>
+          </a:effectRef>
+          <a:fontRef idx="minor">
+            <a:schemeClr val="lt1"/>
+          </a:fontRef>
+        </p:style>
+        <p:txBody>
+          <a:bodyPr rtlCol="0" anchor="ctr"/>
+          <a:lstStyle/>
+          <a:p>
+            <a:pPr algn="ctr"/>
+            <a:endParaRPr lang="en-GB"/>
+          </a:p>
+        </p:txBody>
+      </p:sp>
+      <p:sp>
+        <p:nvSpPr>
+          <p:cNvPr id="9" name="이등변 삼각형 8">
+            <a:extLst>
+              <a:ext uri="{FF2B5EF4-FFF2-40B4-BE49-F238E27FC236}">
+                <a16:creationId xmlns:a16="http://schemas.microsoft.com/office/drawing/2014/main" id="{B29D1EA1-D693-9D3E-CAD5-64DC07A9CB7A}"/>
+              </a:ext>
+            </a:extLst>
+          </p:cNvPr>
+          <p:cNvSpPr/>
+          <p:nvPr/>
+        </p:nvSpPr>
+        <p:spPr>
+          <a:xfrm rot="5400000">
+            <a:off x="6865968" y="2997727"/>
+            <a:ext cx="334029" cy="207390"/>
+          </a:xfrm>
+          <a:prstGeom prst="triangle">
+            <a:avLst/>
+          </a:prstGeom>
+          <a:solidFill>
+            <a:schemeClr val="accent4"/>
+          </a:solidFill>
+          <a:ln>
+            <a:noFill/>
+          </a:ln>
+        </p:spPr>
+        <p:style>
+          <a:lnRef idx="2">
+            <a:schemeClr val="accent1">
+              <a:shade val="15000"/>
+            </a:schemeClr>
+          </a:lnRef>
+          <a:fillRef idx="1">
+            <a:schemeClr val="accent1"/>
+          </a:fillRef>
+          <a:effectRef idx="0">
+            <a:schemeClr val="accent1"/>
+          </a:effectRef>
+          <a:fontRef idx="minor">
+            <a:schemeClr val="lt1"/>
+          </a:fontRef>
+        </p:style>
+        <p:txBody>
+          <a:bodyPr rtlCol="0" anchor="ctr"/>
+          <a:lstStyle/>
+          <a:p>
+            <a:pPr algn="ctr"/>
+            <a:endParaRPr lang="en-GB"/>
+          </a:p>
+        </p:txBody>
+      </p:sp>
+      <p:sp>
+        <p:nvSpPr>
+          <p:cNvPr id="10" name="이등변 삼각형 9">
+            <a:extLst>
+              <a:ext uri="{FF2B5EF4-FFF2-40B4-BE49-F238E27FC236}">
+                <a16:creationId xmlns:a16="http://schemas.microsoft.com/office/drawing/2014/main" id="{94B2BC3C-C0C2-4D26-BC83-800D85894379}"/>
+              </a:ext>
+            </a:extLst>
+          </p:cNvPr>
+          <p:cNvSpPr/>
+          <p:nvPr/>
+        </p:nvSpPr>
+        <p:spPr>
+          <a:xfrm rot="5400000">
+            <a:off x="9115439" y="2997728"/>
+            <a:ext cx="334029" cy="207390"/>
+          </a:xfrm>
+          <a:prstGeom prst="triangle">
+            <a:avLst/>
+          </a:prstGeom>
+          <a:solidFill>
+            <a:schemeClr val="accent4"/>
+          </a:solidFill>
+          <a:ln>
+            <a:noFill/>
+          </a:ln>
+        </p:spPr>
+        <p:style>
+          <a:lnRef idx="2">
+            <a:schemeClr val="accent1">
+              <a:shade val="15000"/>
+            </a:schemeClr>
+          </a:lnRef>
+          <a:fillRef idx="1">
+            <a:schemeClr val="accent1"/>
+          </a:fillRef>
+          <a:effectRef idx="0">
+            <a:schemeClr val="accent1"/>
+          </a:effectRef>
+          <a:fontRef idx="minor">
+            <a:schemeClr val="lt1"/>
+          </a:fontRef>
+        </p:style>
+        <p:txBody>
+          <a:bodyPr rtlCol="0" anchor="ctr"/>
+          <a:lstStyle/>
+          <a:p>
+            <a:pPr algn="ctr"/>
+            <a:endParaRPr lang="en-GB"/>
+          </a:p>
+        </p:txBody>
+      </p:sp>
+    </p:spTree>
+    <p:extLst>
+      <p:ext uri="{BB962C8B-B14F-4D97-AF65-F5344CB8AC3E}">
+        <p14:creationId xmlns:p14="http://schemas.microsoft.com/office/powerpoint/2010/main" val="4294325540"/>
+      </p:ext>
+    </p:extLst>
+  </p:cSld>
+  <p:clrMapOvr>
+    <a:masterClrMapping/>
+  </p:clrMapOvr>
+</p:sld>
+</file>
+
 <file path=ppt/theme/theme1.xml><?xml version="1.0" encoding="utf-8"?>
 <a:theme xmlns:a="http://schemas.openxmlformats.org/drawingml/2006/main" name="Office 테마">
   <a:themeElements>

</xml_diff>